<commit_message>
Updated slides (again :) )
</commit_message>
<xml_diff>
--- a/slides.pptx
+++ b/slides.pptx
@@ -20,7 +20,9 @@
     <p:sldId id="272" r:id="rId14"/>
     <p:sldId id="276" r:id="rId15"/>
     <p:sldId id="270" r:id="rId16"/>
-    <p:sldId id="271" r:id="rId17"/>
+    <p:sldId id="278" r:id="rId17"/>
+    <p:sldId id="277" r:id="rId18"/>
+    <p:sldId id="271" r:id="rId19"/>
   </p:sldIdLst>
   <p:sldSz cx="12192000" cy="6858000"/>
   <p:notesSz cx="7559675" cy="10691813"/>
@@ -11782,6 +11784,1075 @@
   <p:cSld>
     <p:bg>
       <p:bgPr>
+        <a:blipFill rotWithShape="0">
+          <a:blip r:embed="rId2"/>
+          <a:stretch>
+            <a:fillRect/>
+          </a:stretch>
+        </a:blipFill>
+        <a:effectLst/>
+      </p:bgPr>
+    </p:bg>
+    <p:spTree>
+      <p:nvGrpSpPr>
+        <p:cNvPr id="1" name=""/>
+        <p:cNvGrpSpPr/>
+        <p:nvPr/>
+      </p:nvGrpSpPr>
+      <p:grpSpPr>
+        <a:xfrm>
+          <a:off x="0" y="0"/>
+          <a:ext cx="0" cy="0"/>
+          <a:chOff x="0" y="0"/>
+          <a:chExt cx="0" cy="0"/>
+        </a:xfrm>
+      </p:grpSpPr>
+      <p:sp>
+        <p:nvSpPr>
+          <p:cNvPr id="298" name="CustomShape 1"/>
+          <p:cNvSpPr/>
+          <p:nvPr/>
+        </p:nvSpPr>
+        <p:spPr>
+          <a:xfrm>
+            <a:off x="1527480" y="1700280"/>
+            <a:ext cx="4141080" cy="1533960"/>
+          </a:xfrm>
+          <a:prstGeom prst="rect">
+            <a:avLst/>
+          </a:prstGeom>
+          <a:noFill/>
+          <a:ln>
+            <a:noFill/>
+          </a:ln>
+        </p:spPr>
+        <p:style>
+          <a:lnRef idx="0">
+            <a:scrgbClr r="0" g="0" b="0"/>
+          </a:lnRef>
+          <a:fillRef idx="0">
+            <a:scrgbClr r="0" g="0" b="0"/>
+          </a:fillRef>
+          <a:effectRef idx="0">
+            <a:scrgbClr r="0" g="0" b="0"/>
+          </a:effectRef>
+          <a:fontRef idx="minor"/>
+        </p:style>
+        <p:txBody>
+          <a:bodyPr lIns="90000" tIns="45000" rIns="90000" bIns="45000" anchor="ctr"/>
+          <a:lstStyle/>
+          <a:p>
+            <a:pPr marL="0" marR="0" lvl="0" indent="0" algn="l" defTabSz="914400" rtl="0" eaLnBrk="1" fontAlgn="auto" latinLnBrk="0" hangingPunct="1">
+              <a:lnSpc>
+                <a:spcPct val="90000"/>
+              </a:lnSpc>
+              <a:spcBef>
+                <a:spcPts val="0"/>
+              </a:spcBef>
+              <a:spcAft>
+                <a:spcPts val="0"/>
+              </a:spcAft>
+              <a:buClrTx/>
+              <a:buSzTx/>
+              <a:buFontTx/>
+              <a:buNone/>
+              <a:tabLst/>
+              <a:defRPr/>
+            </a:pPr>
+            <a:r>
+              <a:rPr kumimoji="0" lang="en-US" sz="4000" b="1" i="0" u="none" strike="noStrike" kern="1200" cap="none" spc="-1" normalizeH="0" baseline="0" noProof="0" dirty="0">
+                <a:ln>
+                  <a:noFill/>
+                </a:ln>
+                <a:solidFill>
+                  <a:srgbClr val="BE005A"/>
+                </a:solidFill>
+                <a:effectLst/>
+                <a:uLnTx/>
+                <a:uFillTx/>
+                <a:latin typeface="Avenir Next LT Pro"/>
+                <a:ea typeface="DejaVu Sans"/>
+              </a:rPr>
+              <a:t>Q &amp; A?</a:t>
+            </a:r>
+            <a:endParaRPr kumimoji="0" lang="en-US" sz="4000" b="0" i="0" u="none" strike="noStrike" kern="1200" cap="none" spc="-1" normalizeH="0" baseline="0" noProof="0" dirty="0">
+              <a:ln>
+                <a:noFill/>
+              </a:ln>
+              <a:solidFill>
+                <a:prstClr val="black"/>
+              </a:solidFill>
+              <a:effectLst/>
+              <a:uLnTx/>
+              <a:uFillTx/>
+              <a:latin typeface="Arial"/>
+            </a:endParaRPr>
+          </a:p>
+        </p:txBody>
+      </p:sp>
+      <p:sp>
+        <p:nvSpPr>
+          <p:cNvPr id="299" name="CustomShape 2"/>
+          <p:cNvSpPr/>
+          <p:nvPr/>
+        </p:nvSpPr>
+        <p:spPr>
+          <a:xfrm>
+            <a:off x="614880" y="6187680"/>
+            <a:ext cx="3254040" cy="362520"/>
+          </a:xfrm>
+          <a:prstGeom prst="rect">
+            <a:avLst/>
+          </a:prstGeom>
+          <a:noFill/>
+          <a:ln>
+            <a:noFill/>
+          </a:ln>
+        </p:spPr>
+        <p:style>
+          <a:lnRef idx="0">
+            <a:scrgbClr r="0" g="0" b="0"/>
+          </a:lnRef>
+          <a:fillRef idx="0">
+            <a:scrgbClr r="0" g="0" b="0"/>
+          </a:fillRef>
+          <a:effectRef idx="0">
+            <a:scrgbClr r="0" g="0" b="0"/>
+          </a:effectRef>
+          <a:fontRef idx="minor"/>
+        </p:style>
+        <p:txBody>
+          <a:bodyPr lIns="90000" tIns="45000" rIns="90000" bIns="45000" anchor="ctr"/>
+          <a:lstStyle/>
+          <a:p>
+            <a:pPr marL="0" marR="0" lvl="0" indent="0" algn="l" defTabSz="914400" rtl="0" eaLnBrk="1" fontAlgn="auto" latinLnBrk="0" hangingPunct="1">
+              <a:lnSpc>
+                <a:spcPct val="100000"/>
+              </a:lnSpc>
+              <a:spcBef>
+                <a:spcPts val="0"/>
+              </a:spcBef>
+              <a:spcAft>
+                <a:spcPts val="0"/>
+              </a:spcAft>
+              <a:buClrTx/>
+              <a:buSzTx/>
+              <a:buFontTx/>
+              <a:buNone/>
+              <a:tabLst/>
+              <a:defRPr/>
+            </a:pPr>
+            <a:r>
+              <a:rPr kumimoji="0" lang="en-US" sz="1200" b="0" i="1" u="none" strike="noStrike" kern="1200" cap="none" spc="-1" normalizeH="0" baseline="0" noProof="0">
+                <a:ln>
+                  <a:noFill/>
+                </a:ln>
+                <a:solidFill>
+                  <a:srgbClr val="3B2CAC"/>
+                </a:solidFill>
+                <a:effectLst/>
+                <a:uLnTx/>
+                <a:uFillTx/>
+                <a:latin typeface="Speak Pro"/>
+                <a:ea typeface="DejaVu Sans"/>
+              </a:rPr>
+              <a:t>What’s new in FakeXrmEasy v2.x</a:t>
+            </a:r>
+            <a:endParaRPr kumimoji="0" lang="en-US" sz="1200" b="0" i="0" u="none" strike="noStrike" kern="1200" cap="none" spc="-1" normalizeH="0" baseline="0" noProof="0">
+              <a:ln>
+                <a:noFill/>
+              </a:ln>
+              <a:solidFill>
+                <a:prstClr val="black"/>
+              </a:solidFill>
+              <a:effectLst/>
+              <a:uLnTx/>
+              <a:uFillTx/>
+              <a:latin typeface="Arial"/>
+            </a:endParaRPr>
+          </a:p>
+        </p:txBody>
+      </p:sp>
+      <p:sp>
+        <p:nvSpPr>
+          <p:cNvPr id="300" name="CustomShape 3"/>
+          <p:cNvSpPr/>
+          <p:nvPr/>
+        </p:nvSpPr>
+        <p:spPr>
+          <a:xfrm>
+            <a:off x="8849880" y="6187680"/>
+            <a:ext cx="2740680" cy="362520"/>
+          </a:xfrm>
+          <a:prstGeom prst="rect">
+            <a:avLst/>
+          </a:prstGeom>
+          <a:noFill/>
+          <a:ln>
+            <a:noFill/>
+          </a:ln>
+        </p:spPr>
+        <p:style>
+          <a:lnRef idx="0">
+            <a:scrgbClr r="0" g="0" b="0"/>
+          </a:lnRef>
+          <a:fillRef idx="0">
+            <a:scrgbClr r="0" g="0" b="0"/>
+          </a:fillRef>
+          <a:effectRef idx="0">
+            <a:scrgbClr r="0" g="0" b="0"/>
+          </a:effectRef>
+          <a:fontRef idx="minor"/>
+        </p:style>
+        <p:txBody>
+          <a:bodyPr lIns="90000" tIns="45000" rIns="90000" bIns="45000" anchor="ctr"/>
+          <a:lstStyle/>
+          <a:p>
+            <a:pPr marL="0" marR="0" lvl="0" indent="0" algn="r" defTabSz="914400" rtl="0" eaLnBrk="1" fontAlgn="auto" latinLnBrk="0" hangingPunct="1">
+              <a:lnSpc>
+                <a:spcPct val="100000"/>
+              </a:lnSpc>
+              <a:spcBef>
+                <a:spcPts val="0"/>
+              </a:spcBef>
+              <a:spcAft>
+                <a:spcPts val="0"/>
+              </a:spcAft>
+              <a:buClrTx/>
+              <a:buSzTx/>
+              <a:buFontTx/>
+              <a:buNone/>
+              <a:tabLst/>
+              <a:defRPr/>
+            </a:pPr>
+            <a:fld id="{4C2995D3-8C24-48C6-9F78-0D1D23F82B58}" type="slidenum">
+              <a:rPr kumimoji="0" lang="en-US" sz="1200" b="0" i="1" u="none" strike="noStrike" kern="1200" cap="none" spc="-1" normalizeH="0" baseline="0" noProof="0">
+                <a:ln>
+                  <a:noFill/>
+                </a:ln>
+                <a:solidFill>
+                  <a:srgbClr val="FFCD6B"/>
+                </a:solidFill>
+                <a:effectLst/>
+                <a:uLnTx/>
+                <a:uFillTx/>
+                <a:latin typeface="Speak Pro"/>
+                <a:ea typeface="DejaVu Sans"/>
+              </a:rPr>
+              <a:pPr marL="0" marR="0" lvl="0" indent="0" algn="r" defTabSz="914400" rtl="0" eaLnBrk="1" fontAlgn="auto" latinLnBrk="0" hangingPunct="1">
+                <a:lnSpc>
+                  <a:spcPct val="100000"/>
+                </a:lnSpc>
+                <a:spcBef>
+                  <a:spcPts val="0"/>
+                </a:spcBef>
+                <a:spcAft>
+                  <a:spcPts val="0"/>
+                </a:spcAft>
+                <a:buClrTx/>
+                <a:buSzTx/>
+                <a:buFontTx/>
+                <a:buNone/>
+                <a:tabLst/>
+                <a:defRPr/>
+              </a:pPr>
+              <a:t>13</a:t>
+            </a:fld>
+            <a:endParaRPr kumimoji="0" lang="en-US" sz="1200" b="0" i="0" u="none" strike="noStrike" kern="1200" cap="none" spc="-1" normalizeH="0" baseline="0" noProof="0">
+              <a:ln>
+                <a:noFill/>
+              </a:ln>
+              <a:solidFill>
+                <a:prstClr val="black"/>
+              </a:solidFill>
+              <a:effectLst/>
+              <a:uLnTx/>
+              <a:uFillTx/>
+              <a:latin typeface="Arial"/>
+            </a:endParaRPr>
+          </a:p>
+        </p:txBody>
+      </p:sp>
+      <p:sp>
+        <p:nvSpPr>
+          <p:cNvPr id="301" name="CustomShape 4"/>
+          <p:cNvSpPr/>
+          <p:nvPr/>
+        </p:nvSpPr>
+        <p:spPr>
+          <a:xfrm>
+            <a:off x="1527480" y="3279960"/>
+            <a:ext cx="4141080" cy="690120"/>
+          </a:xfrm>
+          <a:prstGeom prst="rect">
+            <a:avLst/>
+          </a:prstGeom>
+          <a:noFill/>
+          <a:ln>
+            <a:noFill/>
+          </a:ln>
+        </p:spPr>
+        <p:style>
+          <a:lnRef idx="0">
+            <a:scrgbClr r="0" g="0" b="0"/>
+          </a:lnRef>
+          <a:fillRef idx="0">
+            <a:scrgbClr r="0" g="0" b="0"/>
+          </a:fillRef>
+          <a:effectRef idx="0">
+            <a:scrgbClr r="0" g="0" b="0"/>
+          </a:effectRef>
+          <a:fontRef idx="minor"/>
+        </p:style>
+        <p:txBody>
+          <a:bodyPr lIns="90000" tIns="45000" rIns="90000" bIns="45000"/>
+          <a:lstStyle/>
+          <a:p>
+            <a:pPr marL="0" marR="0" lvl="0" indent="0" algn="l" defTabSz="914400" rtl="0" eaLnBrk="1" fontAlgn="auto" latinLnBrk="0" hangingPunct="1">
+              <a:lnSpc>
+                <a:spcPct val="90000"/>
+              </a:lnSpc>
+              <a:spcBef>
+                <a:spcPts val="1001"/>
+              </a:spcBef>
+              <a:spcAft>
+                <a:spcPts val="0"/>
+              </a:spcAft>
+              <a:buClrTx/>
+              <a:buSzTx/>
+              <a:buFontTx/>
+              <a:buNone/>
+              <a:tabLst/>
+              <a:defRPr/>
+            </a:pPr>
+            <a:endParaRPr kumimoji="0" lang="en-US" sz="2000" b="0" i="0" u="none" strike="noStrike" kern="1200" cap="none" spc="-1" normalizeH="0" baseline="0" noProof="0" dirty="0">
+              <a:ln>
+                <a:noFill/>
+              </a:ln>
+              <a:solidFill>
+                <a:prstClr val="black"/>
+              </a:solidFill>
+              <a:effectLst/>
+              <a:uLnTx/>
+              <a:uFillTx/>
+              <a:latin typeface="Arial"/>
+            </a:endParaRPr>
+          </a:p>
+        </p:txBody>
+      </p:sp>
+      <p:pic>
+        <p:nvPicPr>
+          <p:cNvPr id="302" name="Picture 9"/>
+          <p:cNvPicPr/>
+          <p:nvPr/>
+        </p:nvPicPr>
+        <p:blipFill>
+          <a:blip r:embed="rId3">
+            <a:lum bright="70000" contrast="-70000"/>
+          </a:blip>
+          <a:stretch/>
+        </p:blipFill>
+        <p:spPr>
+          <a:xfrm>
+            <a:off x="11210040" y="829800"/>
+            <a:ext cx="939240" cy="482040"/>
+          </a:xfrm>
+          <a:prstGeom prst="rect">
+            <a:avLst/>
+          </a:prstGeom>
+          <a:ln>
+            <a:noFill/>
+          </a:ln>
+        </p:spPr>
+      </p:pic>
+      <p:sp>
+        <p:nvSpPr>
+          <p:cNvPr id="303" name="CustomShape 5"/>
+          <p:cNvSpPr/>
+          <p:nvPr/>
+        </p:nvSpPr>
+        <p:spPr>
+          <a:xfrm>
+            <a:off x="6400800" y="1385280"/>
+            <a:ext cx="5209920" cy="3838320"/>
+          </a:xfrm>
+          <a:prstGeom prst="rect">
+            <a:avLst/>
+          </a:prstGeom>
+          <a:noFill/>
+          <a:ln>
+            <a:noFill/>
+          </a:ln>
+        </p:spPr>
+        <p:style>
+          <a:lnRef idx="0">
+            <a:scrgbClr r="0" g="0" b="0"/>
+          </a:lnRef>
+          <a:fillRef idx="0">
+            <a:scrgbClr r="0" g="0" b="0"/>
+          </a:fillRef>
+          <a:effectRef idx="0">
+            <a:scrgbClr r="0" g="0" b="0"/>
+          </a:effectRef>
+          <a:fontRef idx="minor"/>
+        </p:style>
+        <p:txBody>
+          <a:bodyPr lIns="90000" tIns="45000" rIns="90000" bIns="45000">
+            <a:normAutofit/>
+          </a:bodyPr>
+          <a:lstStyle/>
+          <a:p>
+            <a:pPr marL="0" marR="0" lvl="0" indent="0" algn="l" defTabSz="914400" rtl="0" eaLnBrk="1" fontAlgn="auto" latinLnBrk="0" hangingPunct="1">
+              <a:lnSpc>
+                <a:spcPct val="100000"/>
+              </a:lnSpc>
+              <a:spcBef>
+                <a:spcPts val="601"/>
+              </a:spcBef>
+              <a:spcAft>
+                <a:spcPts val="0"/>
+              </a:spcAft>
+              <a:buClrTx/>
+              <a:buSzTx/>
+              <a:buFontTx/>
+              <a:buNone/>
+              <a:tabLst/>
+              <a:defRPr/>
+            </a:pPr>
+            <a:endParaRPr kumimoji="0" lang="en-US" sz="1800" b="0" i="0" u="none" strike="noStrike" kern="1200" cap="none" spc="-1" normalizeH="0" baseline="0" noProof="0">
+              <a:ln>
+                <a:noFill/>
+              </a:ln>
+              <a:solidFill>
+                <a:prstClr val="black"/>
+              </a:solidFill>
+              <a:effectLst/>
+              <a:uLnTx/>
+              <a:uFillTx/>
+              <a:latin typeface="Arial"/>
+            </a:endParaRPr>
+          </a:p>
+          <a:p>
+            <a:pPr marL="0" marR="0" lvl="0" indent="0" algn="l" defTabSz="914400" rtl="0" eaLnBrk="1" fontAlgn="auto" latinLnBrk="0" hangingPunct="1">
+              <a:lnSpc>
+                <a:spcPct val="100000"/>
+              </a:lnSpc>
+              <a:spcBef>
+                <a:spcPts val="601"/>
+              </a:spcBef>
+              <a:spcAft>
+                <a:spcPts val="0"/>
+              </a:spcAft>
+              <a:buClrTx/>
+              <a:buSzTx/>
+              <a:buFontTx/>
+              <a:buNone/>
+              <a:tabLst/>
+              <a:defRPr/>
+            </a:pPr>
+            <a:endParaRPr kumimoji="0" lang="en-US" sz="1800" b="0" i="0" u="none" strike="noStrike" kern="1200" cap="none" spc="-1" normalizeH="0" baseline="0" noProof="0">
+              <a:ln>
+                <a:noFill/>
+              </a:ln>
+              <a:solidFill>
+                <a:prstClr val="black"/>
+              </a:solidFill>
+              <a:effectLst/>
+              <a:uLnTx/>
+              <a:uFillTx/>
+              <a:latin typeface="Arial"/>
+            </a:endParaRPr>
+          </a:p>
+          <a:p>
+            <a:pPr marL="0" marR="0" lvl="0" indent="0" algn="l" defTabSz="914400" rtl="0" eaLnBrk="1" fontAlgn="auto" latinLnBrk="0" hangingPunct="1">
+              <a:lnSpc>
+                <a:spcPct val="100000"/>
+              </a:lnSpc>
+              <a:spcBef>
+                <a:spcPts val="601"/>
+              </a:spcBef>
+              <a:spcAft>
+                <a:spcPts val="0"/>
+              </a:spcAft>
+              <a:buClrTx/>
+              <a:buSzTx/>
+              <a:buFontTx/>
+              <a:buNone/>
+              <a:tabLst/>
+              <a:defRPr/>
+            </a:pPr>
+            <a:endParaRPr kumimoji="0" lang="en-US" sz="1800" b="0" i="0" u="none" strike="noStrike" kern="1200" cap="none" spc="-1" normalizeH="0" baseline="0" noProof="0">
+              <a:ln>
+                <a:noFill/>
+              </a:ln>
+              <a:solidFill>
+                <a:prstClr val="black"/>
+              </a:solidFill>
+              <a:effectLst/>
+              <a:uLnTx/>
+              <a:uFillTx/>
+              <a:latin typeface="Arial"/>
+            </a:endParaRPr>
+          </a:p>
+        </p:txBody>
+      </p:sp>
+      <p:sp>
+        <p:nvSpPr>
+          <p:cNvPr id="304" name="TextShape 6"/>
+          <p:cNvSpPr txBox="1"/>
+          <p:nvPr/>
+        </p:nvSpPr>
+        <p:spPr>
+          <a:xfrm>
+            <a:off x="6583680" y="3310920"/>
+            <a:ext cx="5394960" cy="346680"/>
+          </a:xfrm>
+          <a:prstGeom prst="rect">
+            <a:avLst/>
+          </a:prstGeom>
+          <a:noFill/>
+          <a:ln>
+            <a:noFill/>
+          </a:ln>
+        </p:spPr>
+        <p:txBody>
+          <a:bodyPr lIns="90000" tIns="45000" rIns="90000" bIns="45000"/>
+          <a:lstStyle/>
+          <a:p>
+            <a:pPr marL="0" marR="0" lvl="0" indent="0" algn="l" defTabSz="914400" rtl="0" eaLnBrk="1" fontAlgn="auto" latinLnBrk="0" hangingPunct="1">
+              <a:lnSpc>
+                <a:spcPct val="100000"/>
+              </a:lnSpc>
+              <a:spcBef>
+                <a:spcPts val="0"/>
+              </a:spcBef>
+              <a:spcAft>
+                <a:spcPts val="0"/>
+              </a:spcAft>
+              <a:buClrTx/>
+              <a:buSzTx/>
+              <a:buFontTx/>
+              <a:buNone/>
+              <a:tabLst/>
+              <a:defRPr/>
+            </a:pPr>
+            <a:endParaRPr kumimoji="0" lang="en-US" sz="1400" b="0" i="0" u="none" strike="noStrike" kern="1200" cap="none" spc="-1" normalizeH="0" baseline="0" noProof="0" dirty="0">
+              <a:ln>
+                <a:noFill/>
+              </a:ln>
+              <a:solidFill>
+                <a:srgbClr val="FFFFFF"/>
+              </a:solidFill>
+              <a:effectLst/>
+              <a:uLnTx/>
+              <a:uFillTx/>
+              <a:latin typeface="Arial"/>
+            </a:endParaRPr>
+          </a:p>
+        </p:txBody>
+      </p:sp>
+    </p:spTree>
+    <p:extLst>
+      <p:ext uri="{BB962C8B-B14F-4D97-AF65-F5344CB8AC3E}">
+        <p14:creationId xmlns:p14="http://schemas.microsoft.com/office/powerpoint/2010/main" val="2181329441"/>
+      </p:ext>
+    </p:extLst>
+  </p:cSld>
+  <p:clrMapOvr>
+    <a:masterClrMapping/>
+  </p:clrMapOvr>
+  <p:timing>
+    <p:tnLst>
+      <p:par>
+        <p:cTn id="1" dur="indefinite" restart="never" nodeType="tmRoot">
+          <p:childTnLst>
+            <p:seq>
+              <p:cTn id="2" dur="indefinite" nodeType="mainSeq"/>
+              <p:prevCondLst>
+                <p:cond evt="onPrev" delay="0">
+                  <p:tgtEl>
+                    <p:sldTgt/>
+                  </p:tgtEl>
+                </p:cond>
+              </p:prevCondLst>
+              <p:nextCondLst>
+                <p:cond evt="onNext" delay="0">
+                  <p:tgtEl>
+                    <p:sldTgt/>
+                  </p:tgtEl>
+                </p:cond>
+              </p:nextCondLst>
+            </p:seq>
+          </p:childTnLst>
+        </p:cTn>
+      </p:par>
+    </p:tnLst>
+  </p:timing>
+</p:sld>
+</file>
+
+<file path=ppt/slides/slide14.xml><?xml version="1.0" encoding="utf-8"?>
+<p:sld xmlns:a="http://schemas.openxmlformats.org/drawingml/2006/main" xmlns:r="http://schemas.openxmlformats.org/officeDocument/2006/relationships" xmlns:p="http://schemas.openxmlformats.org/presentationml/2006/main">
+  <p:cSld>
+    <p:bg>
+      <p:bgPr>
+        <a:blipFill rotWithShape="0">
+          <a:blip r:embed="rId2"/>
+          <a:stretch>
+            <a:fillRect/>
+          </a:stretch>
+        </a:blipFill>
+        <a:effectLst/>
+      </p:bgPr>
+    </p:bg>
+    <p:spTree>
+      <p:nvGrpSpPr>
+        <p:cNvPr id="1" name=""/>
+        <p:cNvGrpSpPr/>
+        <p:nvPr/>
+      </p:nvGrpSpPr>
+      <p:grpSpPr>
+        <a:xfrm>
+          <a:off x="0" y="0"/>
+          <a:ext cx="0" cy="0"/>
+          <a:chOff x="0" y="0"/>
+          <a:chExt cx="0" cy="0"/>
+        </a:xfrm>
+      </p:grpSpPr>
+      <p:sp>
+        <p:nvSpPr>
+          <p:cNvPr id="298" name="CustomShape 1"/>
+          <p:cNvSpPr/>
+          <p:nvPr/>
+        </p:nvSpPr>
+        <p:spPr>
+          <a:xfrm>
+            <a:off x="1527480" y="1700280"/>
+            <a:ext cx="4141080" cy="1533960"/>
+          </a:xfrm>
+          <a:prstGeom prst="rect">
+            <a:avLst/>
+          </a:prstGeom>
+          <a:noFill/>
+          <a:ln>
+            <a:noFill/>
+          </a:ln>
+        </p:spPr>
+        <p:style>
+          <a:lnRef idx="0">
+            <a:scrgbClr r="0" g="0" b="0"/>
+          </a:lnRef>
+          <a:fillRef idx="0">
+            <a:scrgbClr r="0" g="0" b="0"/>
+          </a:fillRef>
+          <a:effectRef idx="0">
+            <a:scrgbClr r="0" g="0" b="0"/>
+          </a:effectRef>
+          <a:fontRef idx="minor"/>
+        </p:style>
+        <p:txBody>
+          <a:bodyPr lIns="90000" tIns="45000" rIns="90000" bIns="45000" anchor="ctr"/>
+          <a:lstStyle/>
+          <a:p>
+            <a:pPr>
+              <a:lnSpc>
+                <a:spcPct val="90000"/>
+              </a:lnSpc>
+            </a:pPr>
+            <a:r>
+              <a:rPr lang="en-US" sz="4000" b="1" strike="noStrike" spc="-1" dirty="0">
+                <a:solidFill>
+                  <a:srgbClr val="BE005A"/>
+                </a:solidFill>
+                <a:latin typeface="Avenir Next LT Pro"/>
+                <a:ea typeface="DejaVu Sans"/>
+              </a:rPr>
+              <a:t>New Course coming!</a:t>
+            </a:r>
+            <a:endParaRPr lang="en-US" sz="4000" b="0" strike="noStrike" spc="-1" dirty="0">
+              <a:latin typeface="Arial"/>
+            </a:endParaRPr>
+          </a:p>
+        </p:txBody>
+      </p:sp>
+      <p:sp>
+        <p:nvSpPr>
+          <p:cNvPr id="299" name="CustomShape 2"/>
+          <p:cNvSpPr/>
+          <p:nvPr/>
+        </p:nvSpPr>
+        <p:spPr>
+          <a:xfrm>
+            <a:off x="614880" y="6187680"/>
+            <a:ext cx="3254040" cy="362520"/>
+          </a:xfrm>
+          <a:prstGeom prst="rect">
+            <a:avLst/>
+          </a:prstGeom>
+          <a:noFill/>
+          <a:ln>
+            <a:noFill/>
+          </a:ln>
+        </p:spPr>
+        <p:style>
+          <a:lnRef idx="0">
+            <a:scrgbClr r="0" g="0" b="0"/>
+          </a:lnRef>
+          <a:fillRef idx="0">
+            <a:scrgbClr r="0" g="0" b="0"/>
+          </a:fillRef>
+          <a:effectRef idx="0">
+            <a:scrgbClr r="0" g="0" b="0"/>
+          </a:effectRef>
+          <a:fontRef idx="minor"/>
+        </p:style>
+        <p:txBody>
+          <a:bodyPr lIns="90000" tIns="45000" rIns="90000" bIns="45000" anchor="ctr"/>
+          <a:lstStyle/>
+          <a:p>
+            <a:pPr>
+              <a:lnSpc>
+                <a:spcPct val="100000"/>
+              </a:lnSpc>
+            </a:pPr>
+            <a:r>
+              <a:rPr lang="en-US" sz="1200" b="0" i="1" strike="noStrike" spc="-1">
+                <a:solidFill>
+                  <a:srgbClr val="3B2CAC"/>
+                </a:solidFill>
+                <a:latin typeface="Speak Pro"/>
+                <a:ea typeface="DejaVu Sans"/>
+              </a:rPr>
+              <a:t>What’s new in FakeXrmEasy v2.x</a:t>
+            </a:r>
+            <a:endParaRPr lang="en-US" sz="1200" b="0" strike="noStrike" spc="-1">
+              <a:latin typeface="Arial"/>
+            </a:endParaRPr>
+          </a:p>
+        </p:txBody>
+      </p:sp>
+      <p:sp>
+        <p:nvSpPr>
+          <p:cNvPr id="300" name="CustomShape 3"/>
+          <p:cNvSpPr/>
+          <p:nvPr/>
+        </p:nvSpPr>
+        <p:spPr>
+          <a:xfrm>
+            <a:off x="8849880" y="6187680"/>
+            <a:ext cx="2740680" cy="362520"/>
+          </a:xfrm>
+          <a:prstGeom prst="rect">
+            <a:avLst/>
+          </a:prstGeom>
+          <a:noFill/>
+          <a:ln>
+            <a:noFill/>
+          </a:ln>
+        </p:spPr>
+        <p:style>
+          <a:lnRef idx="0">
+            <a:scrgbClr r="0" g="0" b="0"/>
+          </a:lnRef>
+          <a:fillRef idx="0">
+            <a:scrgbClr r="0" g="0" b="0"/>
+          </a:fillRef>
+          <a:effectRef idx="0">
+            <a:scrgbClr r="0" g="0" b="0"/>
+          </a:effectRef>
+          <a:fontRef idx="minor"/>
+        </p:style>
+        <p:txBody>
+          <a:bodyPr lIns="90000" tIns="45000" rIns="90000" bIns="45000" anchor="ctr"/>
+          <a:lstStyle/>
+          <a:p>
+            <a:pPr algn="r">
+              <a:lnSpc>
+                <a:spcPct val="100000"/>
+              </a:lnSpc>
+            </a:pPr>
+            <a:fld id="{4C2995D3-8C24-48C6-9F78-0D1D23F82B58}" type="slidenum">
+              <a:rPr lang="en-US" sz="1200" b="0" i="1" strike="noStrike" spc="-1">
+                <a:solidFill>
+                  <a:srgbClr val="FFCD6B"/>
+                </a:solidFill>
+                <a:latin typeface="Speak Pro"/>
+                <a:ea typeface="DejaVu Sans"/>
+              </a:rPr>
+              <a:t>14</a:t>
+            </a:fld>
+            <a:endParaRPr lang="en-US" sz="1200" b="0" strike="noStrike" spc="-1">
+              <a:latin typeface="Arial"/>
+            </a:endParaRPr>
+          </a:p>
+        </p:txBody>
+      </p:sp>
+      <p:sp>
+        <p:nvSpPr>
+          <p:cNvPr id="301" name="CustomShape 4"/>
+          <p:cNvSpPr/>
+          <p:nvPr/>
+        </p:nvSpPr>
+        <p:spPr>
+          <a:xfrm>
+            <a:off x="755123" y="3675780"/>
+            <a:ext cx="4141080" cy="690120"/>
+          </a:xfrm>
+          <a:prstGeom prst="rect">
+            <a:avLst/>
+          </a:prstGeom>
+          <a:noFill/>
+          <a:ln>
+            <a:noFill/>
+          </a:ln>
+        </p:spPr>
+        <p:style>
+          <a:lnRef idx="0">
+            <a:scrgbClr r="0" g="0" b="0"/>
+          </a:lnRef>
+          <a:fillRef idx="0">
+            <a:scrgbClr r="0" g="0" b="0"/>
+          </a:fillRef>
+          <a:effectRef idx="0">
+            <a:scrgbClr r="0" g="0" b="0"/>
+          </a:effectRef>
+          <a:fontRef idx="minor"/>
+        </p:style>
+        <p:txBody>
+          <a:bodyPr lIns="90000" tIns="45000" rIns="90000" bIns="45000"/>
+          <a:lstStyle/>
+          <a:p>
+            <a:pPr>
+              <a:lnSpc>
+                <a:spcPct val="90000"/>
+              </a:lnSpc>
+              <a:spcBef>
+                <a:spcPts val="1001"/>
+              </a:spcBef>
+            </a:pPr>
+            <a:endParaRPr lang="en-US" sz="2000" b="0" strike="noStrike" spc="-1" dirty="0">
+              <a:latin typeface="Arial"/>
+            </a:endParaRPr>
+          </a:p>
+        </p:txBody>
+      </p:sp>
+      <p:pic>
+        <p:nvPicPr>
+          <p:cNvPr id="302" name="Picture 9"/>
+          <p:cNvPicPr/>
+          <p:nvPr/>
+        </p:nvPicPr>
+        <p:blipFill>
+          <a:blip r:embed="rId3">
+            <a:lum bright="70000" contrast="-70000"/>
+          </a:blip>
+          <a:stretch/>
+        </p:blipFill>
+        <p:spPr>
+          <a:xfrm>
+            <a:off x="11210040" y="829800"/>
+            <a:ext cx="939240" cy="482040"/>
+          </a:xfrm>
+          <a:prstGeom prst="rect">
+            <a:avLst/>
+          </a:prstGeom>
+          <a:ln>
+            <a:noFill/>
+          </a:ln>
+        </p:spPr>
+      </p:pic>
+      <p:sp>
+        <p:nvSpPr>
+          <p:cNvPr id="303" name="CustomShape 5"/>
+          <p:cNvSpPr/>
+          <p:nvPr/>
+        </p:nvSpPr>
+        <p:spPr>
+          <a:xfrm>
+            <a:off x="6400800" y="1385280"/>
+            <a:ext cx="5209920" cy="3838320"/>
+          </a:xfrm>
+          <a:prstGeom prst="rect">
+            <a:avLst/>
+          </a:prstGeom>
+          <a:noFill/>
+          <a:ln>
+            <a:noFill/>
+          </a:ln>
+        </p:spPr>
+        <p:style>
+          <a:lnRef idx="0">
+            <a:scrgbClr r="0" g="0" b="0"/>
+          </a:lnRef>
+          <a:fillRef idx="0">
+            <a:scrgbClr r="0" g="0" b="0"/>
+          </a:fillRef>
+          <a:effectRef idx="0">
+            <a:scrgbClr r="0" g="0" b="0"/>
+          </a:effectRef>
+          <a:fontRef idx="minor"/>
+        </p:style>
+        <p:txBody>
+          <a:bodyPr lIns="90000" tIns="45000" rIns="90000" bIns="45000">
+            <a:normAutofit/>
+          </a:bodyPr>
+          <a:lstStyle/>
+          <a:p>
+            <a:pPr>
+              <a:lnSpc>
+                <a:spcPct val="100000"/>
+              </a:lnSpc>
+              <a:spcBef>
+                <a:spcPts val="601"/>
+              </a:spcBef>
+            </a:pPr>
+            <a:endParaRPr lang="en-US" sz="1800" b="0" strike="noStrike" spc="-1">
+              <a:latin typeface="Arial"/>
+            </a:endParaRPr>
+          </a:p>
+          <a:p>
+            <a:pPr>
+              <a:lnSpc>
+                <a:spcPct val="100000"/>
+              </a:lnSpc>
+              <a:spcBef>
+                <a:spcPts val="601"/>
+              </a:spcBef>
+            </a:pPr>
+            <a:endParaRPr lang="en-US" sz="1800" b="0" strike="noStrike" spc="-1">
+              <a:latin typeface="Arial"/>
+            </a:endParaRPr>
+          </a:p>
+          <a:p>
+            <a:pPr>
+              <a:lnSpc>
+                <a:spcPct val="100000"/>
+              </a:lnSpc>
+              <a:spcBef>
+                <a:spcPts val="601"/>
+              </a:spcBef>
+            </a:pPr>
+            <a:endParaRPr lang="en-US" sz="1800" b="0" strike="noStrike" spc="-1">
+              <a:latin typeface="Arial"/>
+            </a:endParaRPr>
+          </a:p>
+        </p:txBody>
+      </p:sp>
+      <p:pic>
+        <p:nvPicPr>
+          <p:cNvPr id="4" name="Picture 3">
+            <a:extLst>
+              <a:ext uri="{FF2B5EF4-FFF2-40B4-BE49-F238E27FC236}">
+                <a16:creationId xmlns:a16="http://schemas.microsoft.com/office/drawing/2014/main" id="{836EA7A3-5A63-4EB1-ACDD-47CE552749D6}"/>
+              </a:ext>
+            </a:extLst>
+          </p:cNvPr>
+          <p:cNvPicPr>
+            <a:picLocks noChangeAspect="1"/>
+          </p:cNvPicPr>
+          <p:nvPr/>
+        </p:nvPicPr>
+        <p:blipFill>
+          <a:blip r:embed="rId4">
+            <a:extLst>
+              <a:ext uri="{28A0092B-C50C-407E-A947-70E740481C1C}">
+                <a14:useLocalDpi xmlns:a14="http://schemas.microsoft.com/office/drawing/2010/main" val="0"/>
+              </a:ext>
+            </a:extLst>
+          </a:blip>
+          <a:stretch>
+            <a:fillRect/>
+          </a:stretch>
+        </p:blipFill>
+        <p:spPr>
+          <a:xfrm>
+            <a:off x="5326602" y="1610934"/>
+            <a:ext cx="6865398" cy="3861786"/>
+          </a:xfrm>
+          <a:prstGeom prst="rect">
+            <a:avLst/>
+          </a:prstGeom>
+        </p:spPr>
+      </p:pic>
+      <p:sp>
+        <p:nvSpPr>
+          <p:cNvPr id="5" name="Rectangle 4">
+            <a:extLst>
+              <a:ext uri="{FF2B5EF4-FFF2-40B4-BE49-F238E27FC236}">
+                <a16:creationId xmlns:a16="http://schemas.microsoft.com/office/drawing/2014/main" id="{00BF0966-792F-4EBA-8751-238817ECD7F1}"/>
+              </a:ext>
+            </a:extLst>
+          </p:cNvPr>
+          <p:cNvSpPr/>
+          <p:nvPr/>
+        </p:nvSpPr>
+        <p:spPr>
+          <a:xfrm>
+            <a:off x="546834" y="3836174"/>
+            <a:ext cx="4288353" cy="369332"/>
+          </a:xfrm>
+          <a:prstGeom prst="rect">
+            <a:avLst/>
+          </a:prstGeom>
+        </p:spPr>
+        <p:txBody>
+          <a:bodyPr wrap="none">
+            <a:spAutoFit/>
+          </a:bodyPr>
+          <a:lstStyle/>
+          <a:p>
+            <a:r>
+              <a:rPr lang="en-US" dirty="0"/>
+              <a:t>https://forms.gle/n97oC1LsZgPGmrWh7</a:t>
+            </a:r>
+          </a:p>
+        </p:txBody>
+      </p:sp>
+    </p:spTree>
+    <p:extLst>
+      <p:ext uri="{BB962C8B-B14F-4D97-AF65-F5344CB8AC3E}">
+        <p14:creationId xmlns:p14="http://schemas.microsoft.com/office/powerpoint/2010/main" val="1625419107"/>
+      </p:ext>
+    </p:extLst>
+  </p:cSld>
+  <p:clrMapOvr>
+    <a:masterClrMapping/>
+  </p:clrMapOvr>
+  <p:timing>
+    <p:tnLst>
+      <p:par>
+        <p:cTn id="1" dur="indefinite" restart="never" nodeType="tmRoot">
+          <p:childTnLst>
+            <p:seq>
+              <p:cTn id="2" dur="indefinite" nodeType="mainSeq"/>
+              <p:prevCondLst>
+                <p:cond evt="onPrev" delay="0">
+                  <p:tgtEl>
+                    <p:sldTgt/>
+                  </p:tgtEl>
+                </p:cond>
+              </p:prevCondLst>
+              <p:nextCondLst>
+                <p:cond evt="onNext" delay="0">
+                  <p:tgtEl>
+                    <p:sldTgt/>
+                  </p:tgtEl>
+                </p:cond>
+              </p:nextCondLst>
+            </p:seq>
+          </p:childTnLst>
+        </p:cTn>
+      </p:par>
+    </p:tnLst>
+  </p:timing>
+</p:sld>
+</file>
+
+<file path=ppt/slides/slide15.xml><?xml version="1.0" encoding="utf-8"?>
+<p:sld xmlns:a="http://schemas.openxmlformats.org/drawingml/2006/main" xmlns:r="http://schemas.openxmlformats.org/officeDocument/2006/relationships" xmlns:p="http://schemas.openxmlformats.org/presentationml/2006/main">
+  <p:cSld>
+    <p:bg>
+      <p:bgPr>
         <a:solidFill>
           <a:srgbClr val="3B2CAC">
             <a:alpha val="0"/>
@@ -15973,6 +17044,36 @@
               </a:spcBef>
             </a:pPr>
             <a:r>
+              <a:rPr lang="en-US" sz="1600" b="0" strike="noStrike" spc="-1" dirty="0">
+                <a:solidFill>
+                  <a:srgbClr val="FFFFFF"/>
+                </a:solidFill>
+                <a:latin typeface="Speak Pro"/>
+                <a:ea typeface="DejaVu Sans"/>
+              </a:rPr>
+              <a:t>Aimed at developers using </a:t>
+            </a:r>
+            <a:r>
+              <a:rPr lang="en-US" sz="1600" b="0" strike="noStrike" spc="-1" dirty="0" err="1">
+                <a:solidFill>
+                  <a:srgbClr val="FFFFFF"/>
+                </a:solidFill>
+                <a:latin typeface="Speak Pro"/>
+                <a:ea typeface="DejaVu Sans"/>
+              </a:rPr>
+              <a:t>.net</a:t>
+            </a:r>
+            <a:r>
+              <a:rPr lang="en-US" sz="1600" b="0" strike="noStrike" spc="-1" dirty="0">
+                <a:solidFill>
+                  <a:srgbClr val="FFFFFF"/>
+                </a:solidFill>
+                <a:latin typeface="Speak Pro"/>
+                <a:ea typeface="DejaVu Sans"/>
+              </a:rPr>
+              <a:t> and Power Platform / CDS, </a:t>
+            </a:r>
+            <a:r>
               <a:rPr lang="en-US" sz="1600" b="0" strike="noStrike" spc="-1">
                 <a:solidFill>
                   <a:srgbClr val="FFFFFF"/>
@@ -15980,7 +17081,7 @@
                 <a:latin typeface="Speak Pro"/>
                 <a:ea typeface="DejaVu Sans"/>
               </a:rPr>
-              <a:t>Aimed at developers using .net and Power Platform / CDS</a:t>
+              <a:t>MIT licensed</a:t>
             </a:r>
             <a:endParaRPr lang="en-US" sz="1600" b="0" strike="noStrike" spc="-1">
               <a:latin typeface="Arial"/>

</xml_diff>